<commit_message>
fix pre v3.4 e 3.4_flat
</commit_message>
<xml_diff>
--- a/presentazione/Pagliari Lorenzo - presentazione_v3.4.pptx
+++ b/presentazione/Pagliari Lorenzo - presentazione_v3.4.pptx
@@ -7,10 +7,10 @@
     <p:sldMasterId id="2147483681" r:id="rId3"/>
   </p:sldMasterIdLst>
   <p:notesMasterIdLst>
-    <p:notesMasterId r:id="rId35"/>
+    <p:notesMasterId r:id="rId37"/>
   </p:notesMasterIdLst>
   <p:handoutMasterIdLst>
-    <p:handoutMasterId r:id="rId36"/>
+    <p:handoutMasterId r:id="rId38"/>
   </p:handoutMasterIdLst>
   <p:sldIdLst>
     <p:sldId id="256" r:id="rId4"/>
@@ -42,8 +42,10 @@
     <p:sldId id="288" r:id="rId30"/>
     <p:sldId id="289" r:id="rId31"/>
     <p:sldId id="280" r:id="rId32"/>
-    <p:sldId id="290" r:id="rId33"/>
-    <p:sldId id="291" r:id="rId34"/>
+    <p:sldId id="294" r:id="rId33"/>
+    <p:sldId id="290" r:id="rId34"/>
+    <p:sldId id="291" r:id="rId35"/>
+    <p:sldId id="293" r:id="rId36"/>
   </p:sldIdLst>
   <p:sldSz cx="9144000" cy="6858000" type="screen4x3"/>
   <p:notesSz cx="9906000" cy="6794500"/>
@@ -258,7 +260,7 @@
             <a:fld id="{3012F1C6-8193-4D58-BB28-44CF9C7F83D5}" type="datetimeFigureOut">
               <a:rPr lang="it-IT" smtClean="0"/>
               <a:pPr/>
-              <a:t>28/09/2015</a:t>
+              <a:t>29/09/2015</a:t>
             </a:fld>
             <a:endParaRPr lang="it-IT" dirty="0"/>
           </a:p>
@@ -420,7 +422,7 @@
             <a:fld id="{0A055084-1CB9-CF40-93F3-663EB9ADEB9C}" type="datetimeFigureOut">
               <a:rPr lang="it-IT" smtClean="0"/>
               <a:pPr/>
-              <a:t>28/09/2015</a:t>
+              <a:t>29/09/2015</a:t>
             </a:fld>
             <a:endParaRPr lang="it-IT" dirty="0"/>
           </a:p>
@@ -589,7 +591,7 @@
     </p:spTree>
     <p:extLst>
       <p:ext uri="{BB962C8B-B14F-4D97-AF65-F5344CB8AC3E}">
-        <p14:creationId xmlns="" xmlns:p14="http://schemas.microsoft.com/office/powerpoint/2010/main" val="983607612"/>
+        <p14:creationId xmlns:p14="http://schemas.microsoft.com/office/powerpoint/2010/main" xmlns="" val="983607612"/>
       </p:ext>
     </p:extLst>
   </p:cSld>
@@ -738,7 +740,28 @@
           <a:bodyPr/>
           <a:lstStyle/>
           <a:p>
-            <a:endParaRPr lang="it-IT" b="0" baseline="0" dirty="0" smtClean="0"/>
+            <a:r>
+              <a:rPr lang="it-IT" b="0" baseline="0" dirty="0" smtClean="0"/>
+              <a:t>Algoritmi adattativi</a:t>
+            </a:r>
+          </a:p>
+          <a:p>
+            <a:r>
+              <a:rPr lang="it-IT" b="0" baseline="0" dirty="0" smtClean="0"/>
+              <a:t>Per il risparmio energetico</a:t>
+            </a:r>
+          </a:p>
+          <a:p>
+            <a:r>
+              <a:rPr lang="it-IT" b="0" baseline="0" dirty="0" smtClean="0"/>
+              <a:t>Di sistemi broadcast </a:t>
+            </a:r>
+          </a:p>
+          <a:p>
+            <a:r>
+              <a:rPr lang="it-IT" b="0" baseline="0" dirty="0" smtClean="0"/>
+              <a:t>Via BT</a:t>
+            </a:r>
           </a:p>
         </p:txBody>
       </p:sp>
@@ -769,7 +792,7 @@
     </p:spTree>
     <p:extLst>
       <p:ext uri="{BB962C8B-B14F-4D97-AF65-F5344CB8AC3E}">
-        <p14:creationId xmlns="" xmlns:p14="http://schemas.microsoft.com/office/powerpoint/2010/main" val="1229878964"/>
+        <p14:creationId xmlns:p14="http://schemas.microsoft.com/office/powerpoint/2010/main" xmlns="" val="1229878964"/>
       </p:ext>
     </p:extLst>
   </p:cSld>
@@ -780,6 +803,368 @@
 </file>
 
 <file path=ppt/notesSlides/notesSlide10.xml><?xml version="1.0" encoding="utf-8"?>
+<p:notes xmlns:a="http://schemas.openxmlformats.org/drawingml/2006/main" xmlns:r="http://schemas.openxmlformats.org/officeDocument/2006/relationships" xmlns:p="http://schemas.openxmlformats.org/presentationml/2006/main">
+  <p:cSld>
+    <p:spTree>
+      <p:nvGrpSpPr>
+        <p:cNvPr id="1" name=""/>
+        <p:cNvGrpSpPr/>
+        <p:nvPr/>
+      </p:nvGrpSpPr>
+      <p:grpSpPr>
+        <a:xfrm>
+          <a:off x="0" y="0"/>
+          <a:ext cx="0" cy="0"/>
+          <a:chOff x="0" y="0"/>
+          <a:chExt cx="0" cy="0"/>
+        </a:xfrm>
+      </p:grpSpPr>
+      <p:sp>
+        <p:nvSpPr>
+          <p:cNvPr id="2" name="Segnaposto immagine diapositiva 1"/>
+          <p:cNvSpPr>
+            <a:spLocks noGrp="1" noRot="1" noChangeAspect="1"/>
+          </p:cNvSpPr>
+          <p:nvPr>
+            <p:ph type="sldImg"/>
+          </p:nvPr>
+        </p:nvSpPr>
+        <p:spPr/>
+      </p:sp>
+      <p:sp>
+        <p:nvSpPr>
+          <p:cNvPr id="3" name="Segnaposto note 2"/>
+          <p:cNvSpPr>
+            <a:spLocks noGrp="1"/>
+          </p:cNvSpPr>
+          <p:nvPr>
+            <p:ph type="body" idx="1"/>
+          </p:nvPr>
+        </p:nvSpPr>
+        <p:spPr/>
+        <p:txBody>
+          <a:bodyPr>
+            <a:normAutofit/>
+          </a:bodyPr>
+          <a:lstStyle/>
+          <a:p>
+            <a:r>
+              <a:rPr lang="it-IT" dirty="0" smtClean="0"/>
+              <a:t>AL</a:t>
+            </a:r>
+            <a:r>
+              <a:rPr lang="it-IT" baseline="0" dirty="0" smtClean="0"/>
+              <a:t>:</a:t>
+            </a:r>
+          </a:p>
+          <a:p>
+            <a:pPr>
+              <a:buFontTx/>
+              <a:buChar char="-"/>
+            </a:pPr>
+            <a:r>
+              <a:rPr lang="it-IT" baseline="0" dirty="0" smtClean="0"/>
+              <a:t> Creato per aggiungere intelligenza all’algoritmo</a:t>
+            </a:r>
+          </a:p>
+          <a:p>
+            <a:pPr>
+              <a:buFontTx/>
+              <a:buChar char="-"/>
+            </a:pPr>
+            <a:r>
+              <a:rPr lang="it-IT" baseline="0" dirty="0" smtClean="0"/>
+              <a:t> Serve a far capire lo stato dei nodi vicini</a:t>
+            </a:r>
+            <a:endParaRPr lang="it-IT" dirty="0"/>
+          </a:p>
+        </p:txBody>
+      </p:sp>
+      <p:sp>
+        <p:nvSpPr>
+          <p:cNvPr id="4" name="Segnaposto numero diapositiva 3"/>
+          <p:cNvSpPr>
+            <a:spLocks noGrp="1"/>
+          </p:cNvSpPr>
+          <p:nvPr>
+            <p:ph type="sldNum" sz="quarter" idx="10"/>
+          </p:nvPr>
+        </p:nvSpPr>
+        <p:spPr/>
+        <p:txBody>
+          <a:bodyPr/>
+          <a:lstStyle/>
+          <a:p>
+            <a:fld id="{E73CFAA4-C87D-1545-9F8E-F35BF2220A99}" type="slidenum">
+              <a:rPr lang="it-IT" smtClean="0"/>
+              <a:pPr/>
+              <a:t>15</a:t>
+            </a:fld>
+            <a:endParaRPr lang="it-IT" dirty="0"/>
+          </a:p>
+        </p:txBody>
+      </p:sp>
+    </p:spTree>
+  </p:cSld>
+  <p:clrMapOvr>
+    <a:masterClrMapping/>
+  </p:clrMapOvr>
+</p:notes>
+</file>
+
+<file path=ppt/notesSlides/notesSlide11.xml><?xml version="1.0" encoding="utf-8"?>
+<p:notes xmlns:a="http://schemas.openxmlformats.org/drawingml/2006/main" xmlns:r="http://schemas.openxmlformats.org/officeDocument/2006/relationships" xmlns:p="http://schemas.openxmlformats.org/presentationml/2006/main">
+  <p:cSld>
+    <p:spTree>
+      <p:nvGrpSpPr>
+        <p:cNvPr id="1" name=""/>
+        <p:cNvGrpSpPr/>
+        <p:nvPr/>
+      </p:nvGrpSpPr>
+      <p:grpSpPr>
+        <a:xfrm>
+          <a:off x="0" y="0"/>
+          <a:ext cx="0" cy="0"/>
+          <a:chOff x="0" y="0"/>
+          <a:chExt cx="0" cy="0"/>
+        </a:xfrm>
+      </p:grpSpPr>
+      <p:sp>
+        <p:nvSpPr>
+          <p:cNvPr id="2" name="Segnaposto immagine diapositiva 1"/>
+          <p:cNvSpPr>
+            <a:spLocks noGrp="1" noRot="1" noChangeAspect="1"/>
+          </p:cNvSpPr>
+          <p:nvPr>
+            <p:ph type="sldImg"/>
+          </p:nvPr>
+        </p:nvSpPr>
+        <p:spPr/>
+      </p:sp>
+      <p:sp>
+        <p:nvSpPr>
+          <p:cNvPr id="3" name="Segnaposto note 2"/>
+          <p:cNvSpPr>
+            <a:spLocks noGrp="1"/>
+          </p:cNvSpPr>
+          <p:nvPr>
+            <p:ph type="body" idx="1"/>
+          </p:nvPr>
+        </p:nvSpPr>
+        <p:spPr/>
+        <p:txBody>
+          <a:bodyPr>
+            <a:normAutofit/>
+          </a:bodyPr>
+          <a:lstStyle/>
+          <a:p>
+            <a:r>
+              <a:rPr lang="it-IT" sz="1400" dirty="0" smtClean="0"/>
+              <a:t>Simulatore </a:t>
+            </a:r>
+            <a:r>
+              <a:rPr lang="it-IT" sz="1400" dirty="0" smtClean="0">
+                <a:sym typeface="Wingdings" pitchFamily="2" charset="2"/>
+              </a:rPr>
+              <a:t> OMNeT++</a:t>
+            </a:r>
+          </a:p>
+          <a:p>
+            <a:endParaRPr lang="it-IT" sz="1400" dirty="0" smtClean="0"/>
+          </a:p>
+          <a:p>
+            <a:r>
+              <a:rPr lang="it-IT" sz="1400" dirty="0" smtClean="0"/>
+              <a:t>d=0.02 n/m2</a:t>
+            </a:r>
+            <a:r>
+              <a:rPr lang="it-IT" sz="1400" baseline="0" dirty="0" smtClean="0"/>
+              <a:t>    </a:t>
+            </a:r>
+            <a:r>
+              <a:rPr lang="it-IT" sz="1400" baseline="0" dirty="0" smtClean="0">
+                <a:sym typeface="Wingdings" pitchFamily="2" charset="2"/>
+              </a:rPr>
+              <a:t></a:t>
+            </a:r>
+            <a:r>
+              <a:rPr lang="it-IT" sz="1400" baseline="0" dirty="0" smtClean="0"/>
+              <a:t> Roma</a:t>
+            </a:r>
+            <a:endParaRPr lang="it-IT" sz="1400" dirty="0" smtClean="0"/>
+          </a:p>
+          <a:p>
+            <a:r>
+              <a:rPr lang="it-IT" sz="1400" dirty="0" smtClean="0"/>
+              <a:t>d=0.008</a:t>
+            </a:r>
+            <a:r>
+              <a:rPr lang="it-IT" sz="1400" baseline="0" dirty="0" smtClean="0"/>
+              <a:t> n/m2  </a:t>
+            </a:r>
+            <a:r>
+              <a:rPr lang="it-IT" sz="1400" baseline="0" dirty="0" smtClean="0">
+                <a:sym typeface="Wingdings" pitchFamily="2" charset="2"/>
+              </a:rPr>
+              <a:t></a:t>
+            </a:r>
+            <a:r>
+              <a:rPr lang="it-IT" sz="1400" baseline="0" dirty="0" smtClean="0"/>
+              <a:t>Milano</a:t>
+            </a:r>
+          </a:p>
+          <a:p>
+            <a:r>
+              <a:rPr lang="it-IT" sz="1400" baseline="0" dirty="0" smtClean="0"/>
+              <a:t>d=0.0001 n/m2 </a:t>
+            </a:r>
+            <a:r>
+              <a:rPr lang="it-IT" sz="1400" baseline="0" dirty="0" smtClean="0">
+                <a:sym typeface="Wingdings" pitchFamily="2" charset="2"/>
+              </a:rPr>
+              <a:t></a:t>
+            </a:r>
+            <a:r>
+              <a:rPr lang="it-IT" sz="1400" baseline="0" dirty="0" smtClean="0"/>
+              <a:t>paesino di campagna simile Piadena (0.000181)</a:t>
+            </a:r>
+          </a:p>
+          <a:p>
+            <a:endParaRPr lang="it-IT" sz="1400" baseline="0" dirty="0" smtClean="0"/>
+          </a:p>
+          <a:p>
+            <a:r>
+              <a:rPr lang="it-IT" sz="1400" baseline="0" dirty="0" smtClean="0"/>
+              <a:t>L’EFFICIENZA l’abbiamo definita noi come COPERTURA/TEMPO</a:t>
+            </a:r>
+          </a:p>
+          <a:p>
+            <a:endParaRPr lang="it-IT" dirty="0"/>
+          </a:p>
+        </p:txBody>
+      </p:sp>
+      <p:sp>
+        <p:nvSpPr>
+          <p:cNvPr id="4" name="Segnaposto numero diapositiva 3"/>
+          <p:cNvSpPr>
+            <a:spLocks noGrp="1"/>
+          </p:cNvSpPr>
+          <p:nvPr>
+            <p:ph type="sldNum" sz="quarter" idx="10"/>
+          </p:nvPr>
+        </p:nvSpPr>
+        <p:spPr/>
+        <p:txBody>
+          <a:bodyPr/>
+          <a:lstStyle/>
+          <a:p>
+            <a:fld id="{E73CFAA4-C87D-1545-9F8E-F35BF2220A99}" type="slidenum">
+              <a:rPr lang="it-IT" smtClean="0"/>
+              <a:pPr/>
+              <a:t>18</a:t>
+            </a:fld>
+            <a:endParaRPr lang="it-IT" dirty="0"/>
+          </a:p>
+        </p:txBody>
+      </p:sp>
+    </p:spTree>
+  </p:cSld>
+  <p:clrMapOvr>
+    <a:masterClrMapping/>
+  </p:clrMapOvr>
+</p:notes>
+</file>
+
+<file path=ppt/notesSlides/notesSlide12.xml><?xml version="1.0" encoding="utf-8"?>
+<p:notes xmlns:a="http://schemas.openxmlformats.org/drawingml/2006/main" xmlns:r="http://schemas.openxmlformats.org/officeDocument/2006/relationships" xmlns:p="http://schemas.openxmlformats.org/presentationml/2006/main">
+  <p:cSld>
+    <p:spTree>
+      <p:nvGrpSpPr>
+        <p:cNvPr id="1" name=""/>
+        <p:cNvGrpSpPr/>
+        <p:nvPr/>
+      </p:nvGrpSpPr>
+      <p:grpSpPr>
+        <a:xfrm>
+          <a:off x="0" y="0"/>
+          <a:ext cx="0" cy="0"/>
+          <a:chOff x="0" y="0"/>
+          <a:chExt cx="0" cy="0"/>
+        </a:xfrm>
+      </p:grpSpPr>
+      <p:sp>
+        <p:nvSpPr>
+          <p:cNvPr id="2" name="Segnaposto immagine diapositiva 1"/>
+          <p:cNvSpPr>
+            <a:spLocks noGrp="1" noRot="1" noChangeAspect="1"/>
+          </p:cNvSpPr>
+          <p:nvPr>
+            <p:ph type="sldImg"/>
+          </p:nvPr>
+        </p:nvSpPr>
+        <p:spPr/>
+      </p:sp>
+      <p:sp>
+        <p:nvSpPr>
+          <p:cNvPr id="3" name="Segnaposto note 2"/>
+          <p:cNvSpPr>
+            <a:spLocks noGrp="1"/>
+          </p:cNvSpPr>
+          <p:nvPr>
+            <p:ph type="body" idx="1"/>
+          </p:nvPr>
+        </p:nvSpPr>
+        <p:spPr/>
+        <p:txBody>
+          <a:bodyPr>
+            <a:normAutofit/>
+          </a:bodyPr>
+          <a:lstStyle/>
+          <a:p>
+            <a:r>
+              <a:rPr lang="it-IT" dirty="0" smtClean="0"/>
+              <a:t>Parlare della formazione di sottoreti</a:t>
+            </a:r>
+            <a:r>
+              <a:rPr lang="it-IT" baseline="0" dirty="0" smtClean="0"/>
+              <a:t> e della presenza di nodi isolati per le densità più basse !!</a:t>
+            </a:r>
+          </a:p>
+        </p:txBody>
+      </p:sp>
+      <p:sp>
+        <p:nvSpPr>
+          <p:cNvPr id="4" name="Segnaposto numero diapositiva 3"/>
+          <p:cNvSpPr>
+            <a:spLocks noGrp="1"/>
+          </p:cNvSpPr>
+          <p:nvPr>
+            <p:ph type="sldNum" sz="quarter" idx="10"/>
+          </p:nvPr>
+        </p:nvSpPr>
+        <p:spPr/>
+        <p:txBody>
+          <a:bodyPr/>
+          <a:lstStyle/>
+          <a:p>
+            <a:fld id="{E73CFAA4-C87D-1545-9F8E-F35BF2220A99}" type="slidenum">
+              <a:rPr lang="it-IT" smtClean="0"/>
+              <a:pPr/>
+              <a:t>19</a:t>
+            </a:fld>
+            <a:endParaRPr lang="it-IT" dirty="0"/>
+          </a:p>
+        </p:txBody>
+      </p:sp>
+    </p:spTree>
+  </p:cSld>
+  <p:clrMapOvr>
+    <a:masterClrMapping/>
+  </p:clrMapOvr>
+</p:notes>
+</file>
+
+<file path=ppt/notesSlides/notesSlide13.xml><?xml version="1.0" encoding="utf-8"?>
 <p:notes xmlns:a="http://schemas.openxmlformats.org/drawingml/2006/main" xmlns:r="http://schemas.openxmlformats.org/officeDocument/2006/relationships" xmlns:p="http://schemas.openxmlformats.org/presentationml/2006/main">
   <p:cSld>
     <p:spTree>
@@ -888,7 +1273,7 @@
 </p:notes>
 </file>
 
-<file path=ppt/notesSlides/notesSlide11.xml><?xml version="1.0" encoding="utf-8"?>
+<file path=ppt/notesSlides/notesSlide14.xml><?xml version="1.0" encoding="utf-8"?>
 <p:notes xmlns:a="http://schemas.openxmlformats.org/drawingml/2006/main" xmlns:r="http://schemas.openxmlformats.org/officeDocument/2006/relationships" xmlns:p="http://schemas.openxmlformats.org/presentationml/2006/main">
   <p:cSld>
     <p:spTree>
@@ -986,7 +1371,7 @@
 </p:notes>
 </file>
 
-<file path=ppt/notesSlides/notesSlide12.xml><?xml version="1.0" encoding="utf-8"?>
+<file path=ppt/notesSlides/notesSlide15.xml><?xml version="1.0" encoding="utf-8"?>
 <p:notes xmlns:a="http://schemas.openxmlformats.org/drawingml/2006/main" xmlns:r="http://schemas.openxmlformats.org/officeDocument/2006/relationships" xmlns:p="http://schemas.openxmlformats.org/presentationml/2006/main">
   <p:cSld>
     <p:spTree>
@@ -1101,6 +1486,123 @@
 </p:notes>
 </file>
 
+<file path=ppt/notesSlides/notesSlide16.xml><?xml version="1.0" encoding="utf-8"?>
+<p:notes xmlns:a="http://schemas.openxmlformats.org/drawingml/2006/main" xmlns:r="http://schemas.openxmlformats.org/officeDocument/2006/relationships" xmlns:p="http://schemas.openxmlformats.org/presentationml/2006/main">
+  <p:cSld>
+    <p:spTree>
+      <p:nvGrpSpPr>
+        <p:cNvPr id="1" name=""/>
+        <p:cNvGrpSpPr/>
+        <p:nvPr/>
+      </p:nvGrpSpPr>
+      <p:grpSpPr>
+        <a:xfrm>
+          <a:off x="0" y="0"/>
+          <a:ext cx="0" cy="0"/>
+          <a:chOff x="0" y="0"/>
+          <a:chExt cx="0" cy="0"/>
+        </a:xfrm>
+      </p:grpSpPr>
+      <p:sp>
+        <p:nvSpPr>
+          <p:cNvPr id="2" name="Segnaposto immagine diapositiva 1"/>
+          <p:cNvSpPr>
+            <a:spLocks noGrp="1" noRot="1" noChangeAspect="1"/>
+          </p:cNvSpPr>
+          <p:nvPr>
+            <p:ph type="sldImg"/>
+          </p:nvPr>
+        </p:nvSpPr>
+        <p:spPr/>
+      </p:sp>
+      <p:sp>
+        <p:nvSpPr>
+          <p:cNvPr id="3" name="Segnaposto note 2"/>
+          <p:cNvSpPr>
+            <a:spLocks noGrp="1"/>
+          </p:cNvSpPr>
+          <p:nvPr>
+            <p:ph type="body" idx="1"/>
+          </p:nvPr>
+        </p:nvSpPr>
+        <p:spPr/>
+        <p:txBody>
+          <a:bodyPr>
+            <a:normAutofit/>
+          </a:bodyPr>
+          <a:lstStyle/>
+          <a:p>
+            <a:r>
+              <a:rPr lang="it-IT" dirty="0" smtClean="0"/>
+              <a:t>Il modello da noi creato</a:t>
+            </a:r>
+            <a:r>
+              <a:rPr lang="it-IT" baseline="0" dirty="0" smtClean="0"/>
+              <a:t> è composto da tre fattori.</a:t>
+            </a:r>
+          </a:p>
+          <a:p>
+            <a:pPr marL="228600" indent="-228600">
+              <a:buAutoNum type="arabicParenR"/>
+            </a:pPr>
+            <a:r>
+              <a:rPr lang="it-IT" baseline="0" dirty="0" smtClean="0"/>
+              <a:t>Il FB che rappresenta la dipendenza dal livello della batteria</a:t>
+            </a:r>
+          </a:p>
+          <a:p>
+            <a:pPr marL="228600" indent="-228600">
+              <a:buAutoNum type="arabicParenR"/>
+            </a:pPr>
+            <a:r>
+              <a:rPr lang="it-IT" baseline="0" dirty="0" smtClean="0"/>
+              <a:t>Il FC che va a correggere la monotona crescita delle curve</a:t>
+            </a:r>
+          </a:p>
+          <a:p>
+            <a:pPr marL="228600" indent="-228600">
+              <a:buAutoNum type="arabicParenR"/>
+            </a:pPr>
+            <a:r>
+              <a:rPr lang="it-IT" baseline="0" dirty="0" smtClean="0"/>
+              <a:t>L’asintoto per valori elevati di numero di nodi</a:t>
+            </a:r>
+            <a:endParaRPr lang="it-IT" dirty="0"/>
+          </a:p>
+        </p:txBody>
+      </p:sp>
+      <p:sp>
+        <p:nvSpPr>
+          <p:cNvPr id="4" name="Segnaposto numero diapositiva 3"/>
+          <p:cNvSpPr>
+            <a:spLocks noGrp="1"/>
+          </p:cNvSpPr>
+          <p:nvPr>
+            <p:ph type="sldNum" sz="quarter" idx="10"/>
+          </p:nvPr>
+        </p:nvSpPr>
+        <p:spPr/>
+        <p:txBody>
+          <a:bodyPr/>
+          <a:lstStyle/>
+          <a:p>
+            <a:fld id="{E73CFAA4-C87D-1545-9F8E-F35BF2220A99}" type="slidenum">
+              <a:rPr lang="it-IT" smtClean="0"/>
+              <a:pPr/>
+              <a:t>30</a:t>
+            </a:fld>
+            <a:endParaRPr lang="it-IT" dirty="0"/>
+          </a:p>
+        </p:txBody>
+      </p:sp>
+    </p:spTree>
+  </p:cSld>
+  <p:clrMapOvr>
+    <a:masterClrMapping/>
+  </p:clrMapOvr>
+</p:notes>
+</file>
+
 <file path=ppt/notesSlides/notesSlide2.xml><?xml version="1.0" encoding="utf-8"?>
 <p:notes xmlns:a="http://schemas.openxmlformats.org/drawingml/2006/main" xmlns:r="http://schemas.openxmlformats.org/officeDocument/2006/relationships" xmlns:p="http://schemas.openxmlformats.org/presentationml/2006/main">
   <p:cSld>
@@ -1148,18 +1650,14 @@
           <a:lstStyle/>
           <a:p>
             <a:r>
-              <a:rPr lang="it-IT" dirty="0" smtClean="0"/>
+              <a:rPr lang="it-IT" sz="1200" dirty="0" smtClean="0"/>
               <a:t>Il nostro obiettivo è stato quello di ricercare e progettare una possibile soluzione</a:t>
             </a:r>
             <a:r>
-              <a:rPr lang="it-IT" baseline="0" dirty="0" smtClean="0"/>
-              <a:t> che permetta di diffondere informazioni tra le persone, in situazioni particolari nelle quali </a:t>
+              <a:rPr lang="it-IT" sz="1200" baseline="0" dirty="0" smtClean="0"/>
+              <a:t> che permetta di diffondere informazioni tra le persone, in situazioni particolari nelle quali le normali reti di comunicazione non sono disponibili</a:t>
             </a:r>
-            <a:r>
-              <a:rPr lang="it-IT" baseline="0" smtClean="0"/>
-              <a:t>le </a:t>
-            </a:r>
-            <a:endParaRPr lang="it-IT" dirty="0"/>
+            <a:endParaRPr lang="it-IT" sz="1200" dirty="0"/>
           </a:p>
         </p:txBody>
       </p:sp>
@@ -1241,6 +1739,14 @@
           </a:bodyPr>
           <a:lstStyle/>
           <a:p>
+            <a:r>
+              <a:rPr lang="it-IT" dirty="0" smtClean="0"/>
+              <a:t>Visione globale: permette</a:t>
+            </a:r>
+            <a:r>
+              <a:rPr lang="it-IT" baseline="0" dirty="0" smtClean="0"/>
+              <a:t> ad ogni nodo di trasmettere messaggi verso un altro qualsiasi nodo indipendentemente dalla layout dell’infrastruttura, basta che il destinatario sia connesso alla rete.</a:t>
+            </a:r>
             <a:endParaRPr lang="it-IT" dirty="0"/>
           </a:p>
         </p:txBody>
@@ -1405,6 +1911,206 @@
           </a:bodyPr>
           <a:lstStyle/>
           <a:p>
+            <a:r>
+              <a:rPr lang="it-IT" dirty="0" err="1" smtClean="0"/>
+              <a:t>Smarphone</a:t>
+            </a:r>
+            <a:r>
+              <a:rPr lang="it-IT" dirty="0" smtClean="0"/>
+              <a:t>:</a:t>
+            </a:r>
+            <a:r>
+              <a:rPr lang="it-IT" baseline="0" dirty="0" smtClean="0"/>
+              <a:t> dispositivi a batteria, soggetti ad autonomia  e limitata operatività.</a:t>
+            </a:r>
+          </a:p>
+          <a:p>
+            <a:r>
+              <a:rPr lang="it-IT" baseline="0" dirty="0" smtClean="0"/>
+              <a:t>Consumo energetico: necessario dovuto all’uso di sistemi a batteria</a:t>
+            </a:r>
+            <a:endParaRPr lang="it-IT" dirty="0"/>
+          </a:p>
+        </p:txBody>
+      </p:sp>
+      <p:sp>
+        <p:nvSpPr>
+          <p:cNvPr id="4" name="Segnaposto numero diapositiva 3"/>
+          <p:cNvSpPr>
+            <a:spLocks noGrp="1"/>
+          </p:cNvSpPr>
+          <p:nvPr>
+            <p:ph type="sldNum" sz="quarter" idx="10"/>
+          </p:nvPr>
+        </p:nvSpPr>
+        <p:spPr/>
+        <p:txBody>
+          <a:bodyPr/>
+          <a:lstStyle/>
+          <a:p>
+            <a:fld id="{E73CFAA4-C87D-1545-9F8E-F35BF2220A99}" type="slidenum">
+              <a:rPr lang="it-IT" smtClean="0"/>
+              <a:pPr/>
+              <a:t>7</a:t>
+            </a:fld>
+            <a:endParaRPr lang="it-IT" dirty="0"/>
+          </a:p>
+        </p:txBody>
+      </p:sp>
+    </p:spTree>
+  </p:cSld>
+  <p:clrMapOvr>
+    <a:masterClrMapping/>
+  </p:clrMapOvr>
+</p:notes>
+</file>
+
+<file path=ppt/notesSlides/notesSlide6.xml><?xml version="1.0" encoding="utf-8"?>
+<p:notes xmlns:a="http://schemas.openxmlformats.org/drawingml/2006/main" xmlns:r="http://schemas.openxmlformats.org/officeDocument/2006/relationships" xmlns:p="http://schemas.openxmlformats.org/presentationml/2006/main">
+  <p:cSld>
+    <p:spTree>
+      <p:nvGrpSpPr>
+        <p:cNvPr id="1" name=""/>
+        <p:cNvGrpSpPr/>
+        <p:nvPr/>
+      </p:nvGrpSpPr>
+      <p:grpSpPr>
+        <a:xfrm>
+          <a:off x="0" y="0"/>
+          <a:ext cx="0" cy="0"/>
+          <a:chOff x="0" y="0"/>
+          <a:chExt cx="0" cy="0"/>
+        </a:xfrm>
+      </p:grpSpPr>
+      <p:sp>
+        <p:nvSpPr>
+          <p:cNvPr id="2" name="Segnaposto immagine diapositiva 1"/>
+          <p:cNvSpPr>
+            <a:spLocks noGrp="1" noRot="1" noChangeAspect="1"/>
+          </p:cNvSpPr>
+          <p:nvPr>
+            <p:ph type="sldImg"/>
+          </p:nvPr>
+        </p:nvSpPr>
+        <p:spPr/>
+      </p:sp>
+      <p:sp>
+        <p:nvSpPr>
+          <p:cNvPr id="3" name="Segnaposto note 2"/>
+          <p:cNvSpPr>
+            <a:spLocks noGrp="1"/>
+          </p:cNvSpPr>
+          <p:nvPr>
+            <p:ph type="body" idx="1"/>
+          </p:nvPr>
+        </p:nvSpPr>
+        <p:spPr/>
+        <p:txBody>
+          <a:bodyPr>
+            <a:normAutofit/>
+          </a:bodyPr>
+          <a:lstStyle/>
+          <a:p>
+            <a:pPr>
+              <a:buFontTx/>
+              <a:buChar char="-"/>
+            </a:pPr>
+            <a:r>
+              <a:rPr lang="it-IT" baseline="0" dirty="0" smtClean="0"/>
+              <a:t> Serve a capire quanto grava, in termini di consumo energetico, trasmettere informazioni tramite BT</a:t>
+            </a:r>
+          </a:p>
+          <a:p>
+            <a:pPr>
+              <a:buFontTx/>
+              <a:buChar char="-"/>
+            </a:pPr>
+            <a:r>
+              <a:rPr lang="it-IT" baseline="0" dirty="0" smtClean="0"/>
+              <a:t> Lo studio valuta l’energia richiesta per una singola trasmissione di una informazione, al variare della grandezza dell’informazione stessa.</a:t>
+            </a:r>
+            <a:endParaRPr lang="it-IT" dirty="0"/>
+          </a:p>
+        </p:txBody>
+      </p:sp>
+      <p:sp>
+        <p:nvSpPr>
+          <p:cNvPr id="4" name="Segnaposto numero diapositiva 3"/>
+          <p:cNvSpPr>
+            <a:spLocks noGrp="1"/>
+          </p:cNvSpPr>
+          <p:nvPr>
+            <p:ph type="sldNum" sz="quarter" idx="10"/>
+          </p:nvPr>
+        </p:nvSpPr>
+        <p:spPr/>
+        <p:txBody>
+          <a:bodyPr/>
+          <a:lstStyle/>
+          <a:p>
+            <a:fld id="{E73CFAA4-C87D-1545-9F8E-F35BF2220A99}" type="slidenum">
+              <a:rPr lang="it-IT" smtClean="0"/>
+              <a:pPr/>
+              <a:t>8</a:t>
+            </a:fld>
+            <a:endParaRPr lang="it-IT" dirty="0"/>
+          </a:p>
+        </p:txBody>
+      </p:sp>
+    </p:spTree>
+  </p:cSld>
+  <p:clrMapOvr>
+    <a:masterClrMapping/>
+  </p:clrMapOvr>
+</p:notes>
+</file>
+
+<file path=ppt/notesSlides/notesSlide7.xml><?xml version="1.0" encoding="utf-8"?>
+<p:notes xmlns:a="http://schemas.openxmlformats.org/drawingml/2006/main" xmlns:r="http://schemas.openxmlformats.org/officeDocument/2006/relationships" xmlns:p="http://schemas.openxmlformats.org/presentationml/2006/main">
+  <p:cSld>
+    <p:spTree>
+      <p:nvGrpSpPr>
+        <p:cNvPr id="1" name=""/>
+        <p:cNvGrpSpPr/>
+        <p:nvPr/>
+      </p:nvGrpSpPr>
+      <p:grpSpPr>
+        <a:xfrm>
+          <a:off x="0" y="0"/>
+          <a:ext cx="0" cy="0"/>
+          <a:chOff x="0" y="0"/>
+          <a:chExt cx="0" cy="0"/>
+        </a:xfrm>
+      </p:grpSpPr>
+      <p:sp>
+        <p:nvSpPr>
+          <p:cNvPr id="2" name="Segnaposto immagine diapositiva 1"/>
+          <p:cNvSpPr>
+            <a:spLocks noGrp="1" noRot="1" noChangeAspect="1"/>
+          </p:cNvSpPr>
+          <p:nvPr>
+            <p:ph type="sldImg"/>
+          </p:nvPr>
+        </p:nvSpPr>
+        <p:spPr/>
+      </p:sp>
+      <p:sp>
+        <p:nvSpPr>
+          <p:cNvPr id="3" name="Segnaposto note 2"/>
+          <p:cNvSpPr>
+            <a:spLocks noGrp="1"/>
+          </p:cNvSpPr>
+          <p:nvPr>
+            <p:ph type="body" idx="1"/>
+          </p:nvPr>
+        </p:nvSpPr>
+        <p:spPr/>
+        <p:txBody>
+          <a:bodyPr>
+            <a:normAutofit/>
+          </a:bodyPr>
+          <a:lstStyle/>
+          <a:p>
             <a:endParaRPr lang="it-IT" dirty="0"/>
           </a:p>
         </p:txBody>
@@ -1441,7 +2147,7 @@
 </p:notes>
 </file>
 
-<file path=ppt/notesSlides/notesSlide6.xml><?xml version="1.0" encoding="utf-8"?>
+<file path=ppt/notesSlides/notesSlide8.xml><?xml version="1.0" encoding="utf-8"?>
 <p:notes xmlns:a="http://schemas.openxmlformats.org/drawingml/2006/main" xmlns:r="http://schemas.openxmlformats.org/officeDocument/2006/relationships" xmlns:p="http://schemas.openxmlformats.org/presentationml/2006/main">
   <p:cSld>
     <p:spTree>
@@ -1539,7 +2245,7 @@
 </p:notes>
 </file>
 
-<file path=ppt/notesSlides/notesSlide7.xml><?xml version="1.0" encoding="utf-8"?>
+<file path=ppt/notesSlides/notesSlide9.xml><?xml version="1.0" encoding="utf-8"?>
 <p:notes xmlns:a="http://schemas.openxmlformats.org/drawingml/2006/main" xmlns:r="http://schemas.openxmlformats.org/officeDocument/2006/relationships" xmlns:p="http://schemas.openxmlformats.org/presentationml/2006/main">
   <p:cSld>
     <p:spTree>
@@ -1643,258 +2349,6 @@
               <a:rPr lang="it-IT" smtClean="0"/>
               <a:pPr/>
               <a:t>14</a:t>
-            </a:fld>
-            <a:endParaRPr lang="it-IT" dirty="0"/>
-          </a:p>
-        </p:txBody>
-      </p:sp>
-    </p:spTree>
-  </p:cSld>
-  <p:clrMapOvr>
-    <a:masterClrMapping/>
-  </p:clrMapOvr>
-</p:notes>
-</file>
-
-<file path=ppt/notesSlides/notesSlide8.xml><?xml version="1.0" encoding="utf-8"?>
-<p:notes xmlns:a="http://schemas.openxmlformats.org/drawingml/2006/main" xmlns:r="http://schemas.openxmlformats.org/officeDocument/2006/relationships" xmlns:p="http://schemas.openxmlformats.org/presentationml/2006/main">
-  <p:cSld>
-    <p:spTree>
-      <p:nvGrpSpPr>
-        <p:cNvPr id="1" name=""/>
-        <p:cNvGrpSpPr/>
-        <p:nvPr/>
-      </p:nvGrpSpPr>
-      <p:grpSpPr>
-        <a:xfrm>
-          <a:off x="0" y="0"/>
-          <a:ext cx="0" cy="0"/>
-          <a:chOff x="0" y="0"/>
-          <a:chExt cx="0" cy="0"/>
-        </a:xfrm>
-      </p:grpSpPr>
-      <p:sp>
-        <p:nvSpPr>
-          <p:cNvPr id="2" name="Segnaposto immagine diapositiva 1"/>
-          <p:cNvSpPr>
-            <a:spLocks noGrp="1" noRot="1" noChangeAspect="1"/>
-          </p:cNvSpPr>
-          <p:nvPr>
-            <p:ph type="sldImg"/>
-          </p:nvPr>
-        </p:nvSpPr>
-        <p:spPr/>
-      </p:sp>
-      <p:sp>
-        <p:nvSpPr>
-          <p:cNvPr id="3" name="Segnaposto note 2"/>
-          <p:cNvSpPr>
-            <a:spLocks noGrp="1"/>
-          </p:cNvSpPr>
-          <p:nvPr>
-            <p:ph type="body" idx="1"/>
-          </p:nvPr>
-        </p:nvSpPr>
-        <p:spPr/>
-        <p:txBody>
-          <a:bodyPr>
-            <a:normAutofit/>
-          </a:bodyPr>
-          <a:lstStyle/>
-          <a:p>
-            <a:r>
-              <a:rPr lang="it-IT" sz="1400" dirty="0" smtClean="0"/>
-              <a:t>Simulatore </a:t>
-            </a:r>
-            <a:r>
-              <a:rPr lang="it-IT" sz="1400" dirty="0" smtClean="0">
-                <a:sym typeface="Wingdings" pitchFamily="2" charset="2"/>
-              </a:rPr>
-              <a:t> OMNeT++</a:t>
-            </a:r>
-          </a:p>
-          <a:p>
-            <a:endParaRPr lang="it-IT" sz="1400" dirty="0" smtClean="0"/>
-          </a:p>
-          <a:p>
-            <a:r>
-              <a:rPr lang="it-IT" sz="1400" dirty="0" smtClean="0"/>
-              <a:t>d=0.02 n/m2</a:t>
-            </a:r>
-            <a:r>
-              <a:rPr lang="it-IT" sz="1400" baseline="0" dirty="0" smtClean="0"/>
-              <a:t>    </a:t>
-            </a:r>
-            <a:r>
-              <a:rPr lang="it-IT" sz="1400" baseline="0" dirty="0" smtClean="0">
-                <a:sym typeface="Wingdings" pitchFamily="2" charset="2"/>
-              </a:rPr>
-              <a:t></a:t>
-            </a:r>
-            <a:r>
-              <a:rPr lang="it-IT" sz="1400" baseline="0" dirty="0" smtClean="0"/>
-              <a:t> Roma</a:t>
-            </a:r>
-            <a:endParaRPr lang="it-IT" sz="1400" dirty="0" smtClean="0"/>
-          </a:p>
-          <a:p>
-            <a:r>
-              <a:rPr lang="it-IT" sz="1400" dirty="0" smtClean="0"/>
-              <a:t>d=0.008</a:t>
-            </a:r>
-            <a:r>
-              <a:rPr lang="it-IT" sz="1400" baseline="0" dirty="0" smtClean="0"/>
-              <a:t> n/m2  </a:t>
-            </a:r>
-            <a:r>
-              <a:rPr lang="it-IT" sz="1400" baseline="0" dirty="0" smtClean="0">
-                <a:sym typeface="Wingdings" pitchFamily="2" charset="2"/>
-              </a:rPr>
-              <a:t></a:t>
-            </a:r>
-            <a:r>
-              <a:rPr lang="it-IT" sz="1400" baseline="0" dirty="0" smtClean="0"/>
-              <a:t>Milano</a:t>
-            </a:r>
-          </a:p>
-          <a:p>
-            <a:r>
-              <a:rPr lang="it-IT" sz="1400" baseline="0" dirty="0" smtClean="0"/>
-              <a:t>d=0.0001 n/m2 </a:t>
-            </a:r>
-            <a:r>
-              <a:rPr lang="it-IT" sz="1400" baseline="0" dirty="0" smtClean="0">
-                <a:sym typeface="Wingdings" pitchFamily="2" charset="2"/>
-              </a:rPr>
-              <a:t></a:t>
-            </a:r>
-            <a:r>
-              <a:rPr lang="it-IT" sz="1400" baseline="0" dirty="0" smtClean="0"/>
-              <a:t>paesino di campagna simile Piadena (0.000181)</a:t>
-            </a:r>
-          </a:p>
-          <a:p>
-            <a:endParaRPr lang="it-IT" sz="1400" baseline="0" dirty="0" smtClean="0"/>
-          </a:p>
-          <a:p>
-            <a:r>
-              <a:rPr lang="it-IT" sz="1400" baseline="0" dirty="0" smtClean="0"/>
-              <a:t>L’EFFICIENZA l’abbiamo definita noi come COPERTURA/TEMPO</a:t>
-            </a:r>
-          </a:p>
-          <a:p>
-            <a:endParaRPr lang="it-IT" dirty="0"/>
-          </a:p>
-        </p:txBody>
-      </p:sp>
-      <p:sp>
-        <p:nvSpPr>
-          <p:cNvPr id="4" name="Segnaposto numero diapositiva 3"/>
-          <p:cNvSpPr>
-            <a:spLocks noGrp="1"/>
-          </p:cNvSpPr>
-          <p:nvPr>
-            <p:ph type="sldNum" sz="quarter" idx="10"/>
-          </p:nvPr>
-        </p:nvSpPr>
-        <p:spPr/>
-        <p:txBody>
-          <a:bodyPr/>
-          <a:lstStyle/>
-          <a:p>
-            <a:fld id="{E73CFAA4-C87D-1545-9F8E-F35BF2220A99}" type="slidenum">
-              <a:rPr lang="it-IT" smtClean="0"/>
-              <a:pPr/>
-              <a:t>18</a:t>
-            </a:fld>
-            <a:endParaRPr lang="it-IT" dirty="0"/>
-          </a:p>
-        </p:txBody>
-      </p:sp>
-    </p:spTree>
-  </p:cSld>
-  <p:clrMapOvr>
-    <a:masterClrMapping/>
-  </p:clrMapOvr>
-</p:notes>
-</file>
-
-<file path=ppt/notesSlides/notesSlide9.xml><?xml version="1.0" encoding="utf-8"?>
-<p:notes xmlns:a="http://schemas.openxmlformats.org/drawingml/2006/main" xmlns:r="http://schemas.openxmlformats.org/officeDocument/2006/relationships" xmlns:p="http://schemas.openxmlformats.org/presentationml/2006/main">
-  <p:cSld>
-    <p:spTree>
-      <p:nvGrpSpPr>
-        <p:cNvPr id="1" name=""/>
-        <p:cNvGrpSpPr/>
-        <p:nvPr/>
-      </p:nvGrpSpPr>
-      <p:grpSpPr>
-        <a:xfrm>
-          <a:off x="0" y="0"/>
-          <a:ext cx="0" cy="0"/>
-          <a:chOff x="0" y="0"/>
-          <a:chExt cx="0" cy="0"/>
-        </a:xfrm>
-      </p:grpSpPr>
-      <p:sp>
-        <p:nvSpPr>
-          <p:cNvPr id="2" name="Segnaposto immagine diapositiva 1"/>
-          <p:cNvSpPr>
-            <a:spLocks noGrp="1" noRot="1" noChangeAspect="1"/>
-          </p:cNvSpPr>
-          <p:nvPr>
-            <p:ph type="sldImg"/>
-          </p:nvPr>
-        </p:nvSpPr>
-        <p:spPr/>
-      </p:sp>
-      <p:sp>
-        <p:nvSpPr>
-          <p:cNvPr id="3" name="Segnaposto note 2"/>
-          <p:cNvSpPr>
-            <a:spLocks noGrp="1"/>
-          </p:cNvSpPr>
-          <p:nvPr>
-            <p:ph type="body" idx="1"/>
-          </p:nvPr>
-        </p:nvSpPr>
-        <p:spPr/>
-        <p:txBody>
-          <a:bodyPr>
-            <a:normAutofit/>
-          </a:bodyPr>
-          <a:lstStyle/>
-          <a:p>
-            <a:r>
-              <a:rPr lang="it-IT" dirty="0" smtClean="0"/>
-              <a:t>Parlare della formazione di sottoreti</a:t>
-            </a:r>
-            <a:r>
-              <a:rPr lang="it-IT" baseline="0" dirty="0" smtClean="0"/>
-              <a:t> e della presenza di nodi isolati per le densità più basse !!</a:t>
-            </a:r>
-          </a:p>
-        </p:txBody>
-      </p:sp>
-      <p:sp>
-        <p:nvSpPr>
-          <p:cNvPr id="4" name="Segnaposto numero diapositiva 3"/>
-          <p:cNvSpPr>
-            <a:spLocks noGrp="1"/>
-          </p:cNvSpPr>
-          <p:nvPr>
-            <p:ph type="sldNum" sz="quarter" idx="10"/>
-          </p:nvPr>
-        </p:nvSpPr>
-        <p:spPr/>
-        <p:txBody>
-          <a:bodyPr/>
-          <a:lstStyle/>
-          <a:p>
-            <a:fld id="{E73CFAA4-C87D-1545-9F8E-F35BF2220A99}" type="slidenum">
-              <a:rPr lang="it-IT" smtClean="0"/>
-              <a:pPr/>
-              <a:t>19</a:t>
             </a:fld>
             <a:endParaRPr lang="it-IT" dirty="0"/>
           </a:p>
@@ -2060,7 +2514,7 @@
     </p:spTree>
     <p:extLst>
       <p:ext uri="{BB962C8B-B14F-4D97-AF65-F5344CB8AC3E}">
-        <p14:creationId xmlns="" xmlns:p14="http://schemas.microsoft.com/office/powerpoint/2010/main" val="27430096"/>
+        <p14:creationId xmlns:p14="http://schemas.microsoft.com/office/powerpoint/2010/main" xmlns="" val="27430096"/>
       </p:ext>
     </p:extLst>
   </p:cSld>
@@ -2178,7 +2632,7 @@
     </p:spTree>
     <p:extLst>
       <p:ext uri="{BB962C8B-B14F-4D97-AF65-F5344CB8AC3E}">
-        <p14:creationId xmlns="" xmlns:p14="http://schemas.microsoft.com/office/powerpoint/2010/main" val="1473926903"/>
+        <p14:creationId xmlns:p14="http://schemas.microsoft.com/office/powerpoint/2010/main" xmlns="" val="1473926903"/>
       </p:ext>
     </p:extLst>
   </p:cSld>
@@ -2296,7 +2750,7 @@
     </p:spTree>
     <p:extLst>
       <p:ext uri="{BB962C8B-B14F-4D97-AF65-F5344CB8AC3E}">
-        <p14:creationId xmlns="" xmlns:p14="http://schemas.microsoft.com/office/powerpoint/2010/main" val="1681231856"/>
+        <p14:creationId xmlns:p14="http://schemas.microsoft.com/office/powerpoint/2010/main" xmlns="" val="1681231856"/>
       </p:ext>
     </p:extLst>
   </p:cSld>
@@ -2458,7 +2912,7 @@
     </p:spTree>
     <p:extLst>
       <p:ext uri="{BB962C8B-B14F-4D97-AF65-F5344CB8AC3E}">
-        <p14:creationId xmlns="" xmlns:p14="http://schemas.microsoft.com/office/powerpoint/2010/main" val="27430096"/>
+        <p14:creationId xmlns:p14="http://schemas.microsoft.com/office/powerpoint/2010/main" xmlns="" val="27430096"/>
       </p:ext>
     </p:extLst>
   </p:cSld>
@@ -2511,7 +2965,7 @@
     </p:spTree>
     <p:extLst>
       <p:ext uri="{BB962C8B-B14F-4D97-AF65-F5344CB8AC3E}">
-        <p14:creationId xmlns="" xmlns:p14="http://schemas.microsoft.com/office/powerpoint/2010/main" val="1191776143"/>
+        <p14:creationId xmlns:p14="http://schemas.microsoft.com/office/powerpoint/2010/main" xmlns="" val="1191776143"/>
       </p:ext>
     </p:extLst>
   </p:cSld>
@@ -2541,7 +2995,7 @@
     </p:spTree>
     <p:extLst>
       <p:ext uri="{BB962C8B-B14F-4D97-AF65-F5344CB8AC3E}">
-        <p14:creationId xmlns="" xmlns:p14="http://schemas.microsoft.com/office/powerpoint/2010/main" val="871637495"/>
+        <p14:creationId xmlns:p14="http://schemas.microsoft.com/office/powerpoint/2010/main" xmlns="" val="871637495"/>
       </p:ext>
     </p:extLst>
   </p:cSld>
@@ -2594,7 +3048,7 @@
     </p:spTree>
     <p:extLst>
       <p:ext uri="{BB962C8B-B14F-4D97-AF65-F5344CB8AC3E}">
-        <p14:creationId xmlns="" xmlns:p14="http://schemas.microsoft.com/office/powerpoint/2010/main" val="1191776143"/>
+        <p14:creationId xmlns:p14="http://schemas.microsoft.com/office/powerpoint/2010/main" xmlns="" val="1191776143"/>
       </p:ext>
     </p:extLst>
   </p:cSld>
@@ -2624,7 +3078,7 @@
     </p:spTree>
     <p:extLst>
       <p:ext uri="{BB962C8B-B14F-4D97-AF65-F5344CB8AC3E}">
-        <p14:creationId xmlns="" xmlns:p14="http://schemas.microsoft.com/office/powerpoint/2010/main" val="871637495"/>
+        <p14:creationId xmlns:p14="http://schemas.microsoft.com/office/powerpoint/2010/main" xmlns="" val="871637495"/>
       </p:ext>
     </p:extLst>
   </p:cSld>
@@ -2711,7 +3165,7 @@
     </p:spTree>
     <p:extLst>
       <p:ext uri="{BB962C8B-B14F-4D97-AF65-F5344CB8AC3E}">
-        <p14:creationId xmlns="" xmlns:p14="http://schemas.microsoft.com/office/powerpoint/2010/main" val="1724467125"/>
+        <p14:creationId xmlns:p14="http://schemas.microsoft.com/office/powerpoint/2010/main" xmlns="" val="1724467125"/>
       </p:ext>
     </p:extLst>
   </p:cSld>
@@ -2894,7 +3348,7 @@
     </p:spTree>
     <p:extLst>
       <p:ext uri="{BB962C8B-B14F-4D97-AF65-F5344CB8AC3E}">
-        <p14:creationId xmlns="" xmlns:p14="http://schemas.microsoft.com/office/powerpoint/2010/main" val="3825920509"/>
+        <p14:creationId xmlns:p14="http://schemas.microsoft.com/office/powerpoint/2010/main" xmlns="" val="3825920509"/>
       </p:ext>
     </p:extLst>
   </p:cSld>
@@ -3012,7 +3466,7 @@
     </p:spTree>
     <p:extLst>
       <p:ext uri="{BB962C8B-B14F-4D97-AF65-F5344CB8AC3E}">
-        <p14:creationId xmlns="" xmlns:p14="http://schemas.microsoft.com/office/powerpoint/2010/main" val="1473926903"/>
+        <p14:creationId xmlns:p14="http://schemas.microsoft.com/office/powerpoint/2010/main" xmlns="" val="1473926903"/>
       </p:ext>
     </p:extLst>
   </p:cSld>
@@ -3130,7 +3584,7 @@
     </p:spTree>
     <p:extLst>
       <p:ext uri="{BB962C8B-B14F-4D97-AF65-F5344CB8AC3E}">
-        <p14:creationId xmlns="" xmlns:p14="http://schemas.microsoft.com/office/powerpoint/2010/main" val="1681231856"/>
+        <p14:creationId xmlns:p14="http://schemas.microsoft.com/office/powerpoint/2010/main" xmlns="" val="1681231856"/>
       </p:ext>
     </p:extLst>
   </p:cSld>
@@ -3217,7 +3671,7 @@
     </p:spTree>
     <p:extLst>
       <p:ext uri="{BB962C8B-B14F-4D97-AF65-F5344CB8AC3E}">
-        <p14:creationId xmlns="" xmlns:p14="http://schemas.microsoft.com/office/powerpoint/2010/main" val="1724467125"/>
+        <p14:creationId xmlns:p14="http://schemas.microsoft.com/office/powerpoint/2010/main" xmlns="" val="1724467125"/>
       </p:ext>
     </p:extLst>
   </p:cSld>
@@ -3400,7 +3854,7 @@
     </p:spTree>
     <p:extLst>
       <p:ext uri="{BB962C8B-B14F-4D97-AF65-F5344CB8AC3E}">
-        <p14:creationId xmlns="" xmlns:p14="http://schemas.microsoft.com/office/powerpoint/2010/main" val="3825920509"/>
+        <p14:creationId xmlns:p14="http://schemas.microsoft.com/office/powerpoint/2010/main" xmlns="" val="3825920509"/>
       </p:ext>
     </p:extLst>
   </p:cSld>
@@ -3447,7 +3901,7 @@
           <a:blip r:embed="rId5" cstate="print">
             <a:extLst>
               <a:ext uri="{28A0092B-C50C-407E-A947-70E740481C1C}">
-                <a14:useLocalDpi xmlns="" xmlns:a14="http://schemas.microsoft.com/office/drawing/2010/main" val="0"/>
+                <a14:useLocalDpi xmlns:a14="http://schemas.microsoft.com/office/drawing/2010/main" xmlns="" val="0"/>
               </a:ext>
             </a:extLst>
           </a:blip>
@@ -3470,14 +3924,14 @@
           </a:ln>
           <a:extLst>
             <a:ext uri="{909E8E84-426E-40dd-AFC4-6F175D3DCCD1}">
-              <a14:hiddenFill xmlns="" xmlns:a14="http://schemas.microsoft.com/office/drawing/2010/main">
+              <a14:hiddenFill xmlns:a14="http://schemas.microsoft.com/office/drawing/2010/main" xmlns="">
                 <a:solidFill>
                   <a:srgbClr val="FFFFFF"/>
                 </a:solidFill>
               </a14:hiddenFill>
             </a:ext>
             <a:ext uri="{91240B29-F687-4f45-9708-019B960494DF}">
-              <a14:hiddenLine xmlns="" xmlns:a14="http://schemas.microsoft.com/office/drawing/2010/main" w="9525">
+              <a14:hiddenLine xmlns:a14="http://schemas.microsoft.com/office/drawing/2010/main" xmlns="" w="9525">
                 <a:solidFill>
                   <a:srgbClr val="000000"/>
                 </a:solidFill>
@@ -3555,14 +4009,14 @@
           </a:ln>
           <a:extLst>
             <a:ext uri="{909E8E84-426E-40dd-AFC4-6F175D3DCCD1}">
-              <a14:hiddenFill xmlns="" xmlns:a14="http://schemas.microsoft.com/office/drawing/2010/main">
+              <a14:hiddenFill xmlns:a14="http://schemas.microsoft.com/office/drawing/2010/main" xmlns="">
                 <a:solidFill>
                   <a:srgbClr val="FFFFFF"/>
                 </a:solidFill>
               </a14:hiddenFill>
             </a:ext>
             <a:ext uri="{91240B29-F687-4f45-9708-019B960494DF}">
-              <a14:hiddenLine xmlns="" xmlns:a14="http://schemas.microsoft.com/office/drawing/2010/main" w="9525">
+              <a14:hiddenLine xmlns:a14="http://schemas.microsoft.com/office/drawing/2010/main" xmlns="" w="9525">
                 <a:solidFill>
                   <a:srgbClr val="000000"/>
                 </a:solidFill>
@@ -3572,7 +4026,7 @@
               </a14:hiddenLine>
             </a:ext>
             <a:ext uri="{FAA26D3D-D897-4be2-8F04-BA451C77F1D7}">
-              <ma14:placeholderFlag xmlns="" xmlns:ma14="http://schemas.microsoft.com/office/mac/drawingml/2011/main" val="1"/>
+              <ma14:placeholderFlag xmlns:ma14="http://schemas.microsoft.com/office/mac/drawingml/2011/main" xmlns="" val="1"/>
             </a:ext>
           </a:extLst>
         </p:spPr>
@@ -3621,14 +4075,14 @@
           </a:ln>
           <a:extLst>
             <a:ext uri="{909E8E84-426E-40dd-AFC4-6F175D3DCCD1}">
-              <a14:hiddenFill xmlns="" xmlns:a14="http://schemas.microsoft.com/office/drawing/2010/main">
+              <a14:hiddenFill xmlns:a14="http://schemas.microsoft.com/office/drawing/2010/main" xmlns="">
                 <a:solidFill>
                   <a:srgbClr val="FFFFFF"/>
                 </a:solidFill>
               </a14:hiddenFill>
             </a:ext>
             <a:ext uri="{91240B29-F687-4f45-9708-019B960494DF}">
-              <a14:hiddenLine xmlns="" xmlns:a14="http://schemas.microsoft.com/office/drawing/2010/main" w="9525">
+              <a14:hiddenLine xmlns:a14="http://schemas.microsoft.com/office/drawing/2010/main" xmlns="" w="9525">
                 <a:solidFill>
                   <a:srgbClr val="000000"/>
                 </a:solidFill>
@@ -3638,7 +4092,7 @@
               </a14:hiddenLine>
             </a:ext>
             <a:ext uri="{FAA26D3D-D897-4be2-8F04-BA451C77F1D7}">
-              <ma14:placeholderFlag xmlns="" xmlns:ma14="http://schemas.microsoft.com/office/mac/drawingml/2011/main" val="1"/>
+              <ma14:placeholderFlag xmlns:ma14="http://schemas.microsoft.com/office/mac/drawingml/2011/main" xmlns="" val="1"/>
             </a:ext>
           </a:extLst>
         </p:spPr>
@@ -3682,7 +4136,7 @@
     </p:spTree>
     <p:extLst>
       <p:ext uri="{BB962C8B-B14F-4D97-AF65-F5344CB8AC3E}">
-        <p14:creationId xmlns="" xmlns:p14="http://schemas.microsoft.com/office/powerpoint/2010/main" val="4048614870"/>
+        <p14:creationId xmlns:p14="http://schemas.microsoft.com/office/powerpoint/2010/main" xmlns="" val="4048614870"/>
       </p:ext>
     </p:extLst>
   </p:cSld>
@@ -4133,14 +4587,14 @@
           <a:effectLst/>
           <a:extLst>
             <a:ext uri="{909E8E84-426E-40dd-AFC4-6F175D3DCCD1}">
-              <a14:hiddenFill xmlns="" xmlns:a14="http://schemas.microsoft.com/office/drawing/2010/main">
+              <a14:hiddenFill xmlns:a14="http://schemas.microsoft.com/office/drawing/2010/main" xmlns="">
                 <a:solidFill>
                   <a:schemeClr val="accent1"/>
                 </a:solidFill>
               </a14:hiddenFill>
             </a:ext>
             <a:ext uri="{91240B29-F687-4f45-9708-019B960494DF}">
-              <a14:hiddenLine xmlns="" xmlns:a14="http://schemas.microsoft.com/office/drawing/2010/main" w="9525">
+              <a14:hiddenLine xmlns:a14="http://schemas.microsoft.com/office/drawing/2010/main" xmlns="" w="9525">
                 <a:solidFill>
                   <a:srgbClr val="FF6600"/>
                 </a:solidFill>
@@ -4150,7 +4604,7 @@
               </a14:hiddenLine>
             </a:ext>
             <a:ext uri="{AF507438-7753-43e0-B8FC-AC1667EBCBE1}">
-              <a14:hiddenEffects xmlns="" xmlns:a14="http://schemas.microsoft.com/office/drawing/2010/main">
+              <a14:hiddenEffects xmlns:a14="http://schemas.microsoft.com/office/drawing/2010/main" xmlns="">
                 <a:effectLst>
                   <a:outerShdw blurRad="63500" dist="38099" dir="2700000" algn="ctr" rotWithShape="0">
                     <a:schemeClr val="bg2">
@@ -4706,7 +5160,7 @@
           <a:blip r:embed="rId5" cstate="print">
             <a:extLst>
               <a:ext uri="{28A0092B-C50C-407E-A947-70E740481C1C}">
-                <a14:useLocalDpi xmlns="" xmlns:a14="http://schemas.microsoft.com/office/drawing/2010/main" val="0"/>
+                <a14:useLocalDpi xmlns:a14="http://schemas.microsoft.com/office/drawing/2010/main" xmlns="" val="0"/>
               </a:ext>
             </a:extLst>
           </a:blip>
@@ -4729,14 +5183,14 @@
           </a:ln>
           <a:extLst>
             <a:ext uri="{909E8E84-426E-40dd-AFC4-6F175D3DCCD1}">
-              <a14:hiddenFill xmlns="" xmlns:a14="http://schemas.microsoft.com/office/drawing/2010/main">
+              <a14:hiddenFill xmlns:a14="http://schemas.microsoft.com/office/drawing/2010/main" xmlns="">
                 <a:solidFill>
                   <a:srgbClr val="FFFFFF"/>
                 </a:solidFill>
               </a14:hiddenFill>
             </a:ext>
             <a:ext uri="{91240B29-F687-4f45-9708-019B960494DF}">
-              <a14:hiddenLine xmlns="" xmlns:a14="http://schemas.microsoft.com/office/drawing/2010/main" w="9525">
+              <a14:hiddenLine xmlns:a14="http://schemas.microsoft.com/office/drawing/2010/main" xmlns="" w="9525">
                 <a:solidFill>
                   <a:srgbClr val="000000"/>
                 </a:solidFill>
@@ -4814,14 +5268,14 @@
           </a:ln>
           <a:extLst>
             <a:ext uri="{909E8E84-426E-40dd-AFC4-6F175D3DCCD1}">
-              <a14:hiddenFill xmlns="" xmlns:a14="http://schemas.microsoft.com/office/drawing/2010/main">
+              <a14:hiddenFill xmlns:a14="http://schemas.microsoft.com/office/drawing/2010/main" xmlns="">
                 <a:solidFill>
                   <a:srgbClr val="FFFFFF"/>
                 </a:solidFill>
               </a14:hiddenFill>
             </a:ext>
             <a:ext uri="{91240B29-F687-4f45-9708-019B960494DF}">
-              <a14:hiddenLine xmlns="" xmlns:a14="http://schemas.microsoft.com/office/drawing/2010/main" w="9525">
+              <a14:hiddenLine xmlns:a14="http://schemas.microsoft.com/office/drawing/2010/main" xmlns="" w="9525">
                 <a:solidFill>
                   <a:srgbClr val="000000"/>
                 </a:solidFill>
@@ -4831,7 +5285,7 @@
               </a14:hiddenLine>
             </a:ext>
             <a:ext uri="{FAA26D3D-D897-4be2-8F04-BA451C77F1D7}">
-              <ma14:placeholderFlag xmlns="" xmlns:ma14="http://schemas.microsoft.com/office/mac/drawingml/2011/main" val="1"/>
+              <ma14:placeholderFlag xmlns:ma14="http://schemas.microsoft.com/office/mac/drawingml/2011/main" xmlns="" val="1"/>
             </a:ext>
           </a:extLst>
         </p:spPr>
@@ -4880,14 +5334,14 @@
           </a:ln>
           <a:extLst>
             <a:ext uri="{909E8E84-426E-40dd-AFC4-6F175D3DCCD1}">
-              <a14:hiddenFill xmlns="" xmlns:a14="http://schemas.microsoft.com/office/drawing/2010/main">
+              <a14:hiddenFill xmlns:a14="http://schemas.microsoft.com/office/drawing/2010/main" xmlns="">
                 <a:solidFill>
                   <a:srgbClr val="FFFFFF"/>
                 </a:solidFill>
               </a14:hiddenFill>
             </a:ext>
             <a:ext uri="{91240B29-F687-4f45-9708-019B960494DF}">
-              <a14:hiddenLine xmlns="" xmlns:a14="http://schemas.microsoft.com/office/drawing/2010/main" w="9525">
+              <a14:hiddenLine xmlns:a14="http://schemas.microsoft.com/office/drawing/2010/main" xmlns="" w="9525">
                 <a:solidFill>
                   <a:srgbClr val="000000"/>
                 </a:solidFill>
@@ -4897,7 +5351,7 @@
               </a14:hiddenLine>
             </a:ext>
             <a:ext uri="{FAA26D3D-D897-4be2-8F04-BA451C77F1D7}">
-              <ma14:placeholderFlag xmlns="" xmlns:ma14="http://schemas.microsoft.com/office/mac/drawingml/2011/main" val="1"/>
+              <ma14:placeholderFlag xmlns:ma14="http://schemas.microsoft.com/office/mac/drawingml/2011/main" xmlns="" val="1"/>
             </a:ext>
           </a:extLst>
         </p:spPr>
@@ -4941,7 +5395,7 @@
     </p:spTree>
     <p:extLst>
       <p:ext uri="{BB962C8B-B14F-4D97-AF65-F5344CB8AC3E}">
-        <p14:creationId xmlns="" xmlns:p14="http://schemas.microsoft.com/office/powerpoint/2010/main" val="4048614870"/>
+        <p14:creationId xmlns:p14="http://schemas.microsoft.com/office/powerpoint/2010/main" xmlns="" val="4048614870"/>
       </p:ext>
     </p:extLst>
   </p:cSld>
@@ -5603,7 +6057,7 @@
           <a:blip r:embed="rId3" cstate="print">
             <a:extLst>
               <a:ext uri="{28A0092B-C50C-407E-A947-70E740481C1C}">
-                <a14:useLocalDpi xmlns="" xmlns:a14="http://schemas.microsoft.com/office/drawing/2010/main" val="0"/>
+                <a14:useLocalDpi xmlns:a14="http://schemas.microsoft.com/office/drawing/2010/main" xmlns="" val="0"/>
               </a:ext>
             </a:extLst>
           </a:blip>
@@ -5624,7 +6078,7 @@
     </p:spTree>
     <p:extLst>
       <p:ext uri="{BB962C8B-B14F-4D97-AF65-F5344CB8AC3E}">
-        <p14:creationId xmlns="" xmlns:p14="http://schemas.microsoft.com/office/powerpoint/2010/main" val="2572022632"/>
+        <p14:creationId xmlns:p14="http://schemas.microsoft.com/office/powerpoint/2010/main" xmlns="" val="2572022632"/>
       </p:ext>
     </p:extLst>
   </p:cSld>
@@ -5632,7 +6086,7 @@
     <a:masterClrMapping/>
   </p:clrMapOvr>
   <mc:AlternateContent xmlns:mc="http://schemas.openxmlformats.org/markup-compatibility/2006">
-    <mc:Choice xmlns="" xmlns:p14="http://schemas.microsoft.com/office/powerpoint/2010/main" Requires="p14">
+    <mc:Choice xmlns:p14="http://schemas.microsoft.com/office/powerpoint/2010/main" xmlns="" Requires="p14">
       <p:transition spd="slow" p14:dur="2000" advTm="19458"/>
     </mc:Choice>
     <mc:Fallback>
@@ -6615,7 +7069,34 @@
               <a:buChar char="Ø"/>
             </a:pPr>
             <a:r>
-              <a:rPr lang="it-IT" sz="2000" i="1" dirty="0" smtClean="0">
+              <a:rPr lang="it-IT" sz="2000" i="1" dirty="0" err="1" smtClean="0">
+                <a:solidFill>
+                  <a:srgbClr val="C00000"/>
+                </a:solidFill>
+              </a:rPr>
+              <a:t>Counter</a:t>
+            </a:r>
+            <a:r>
+              <a:rPr lang="it-IT" sz="2000" dirty="0" smtClean="0">
+                <a:solidFill>
+                  <a:schemeClr val="tx2"/>
+                </a:solidFill>
+              </a:rPr>
+              <a:t>: termina quando il contatore raggiunge una certa soglia</a:t>
+            </a:r>
+            <a:endParaRPr lang="it-IT" sz="2000" i="1" dirty="0" smtClean="0">
+              <a:solidFill>
+                <a:srgbClr val="C00000"/>
+              </a:solidFill>
+            </a:endParaRPr>
+          </a:p>
+          <a:p>
+            <a:pPr marL="360363" indent="-360363">
+              <a:buFont typeface="Wingdings" pitchFamily="2" charset="2"/>
+              <a:buChar char="Ø"/>
+            </a:pPr>
+            <a:r>
+              <a:rPr lang="it-IT" sz="2000" i="1" dirty="0" err="1" smtClean="0">
                 <a:solidFill>
                   <a:srgbClr val="C00000"/>
                 </a:solidFill>
@@ -6629,28 +7110,6 @@
                 </a:solidFill>
               </a:rPr>
               <a:t>: la decisione dipende solo dallo stato interno del dispositivo</a:t>
-            </a:r>
-          </a:p>
-          <a:p>
-            <a:pPr marL="360363" indent="-360363">
-              <a:buFont typeface="Wingdings" pitchFamily="2" charset="2"/>
-              <a:buChar char="Ø"/>
-            </a:pPr>
-            <a:r>
-              <a:rPr lang="it-IT" sz="2000" i="1" dirty="0" smtClean="0">
-                <a:solidFill>
-                  <a:srgbClr val="C00000"/>
-                </a:solidFill>
-              </a:rPr>
-              <a:t>Counter</a:t>
-            </a:r>
-            <a:r>
-              <a:rPr lang="it-IT" sz="2000" dirty="0" smtClean="0">
-                <a:solidFill>
-                  <a:schemeClr val="tx2"/>
-                </a:solidFill>
-              </a:rPr>
-              <a:t>: termina quando il contatore raggiunge una certa soglia</a:t>
             </a:r>
           </a:p>
         </p:txBody>
@@ -6686,7 +7145,7 @@
         </p:nvSpPr>
         <p:spPr>
           <a:xfrm>
-            <a:off x="2036618" y="3358077"/>
+            <a:off x="1949534" y="3353461"/>
             <a:ext cx="5723082" cy="1939637"/>
           </a:xfrm>
           <a:prstGeom prst="wedgeRoundRectCallout">
@@ -6737,7 +7196,7 @@
         </p:nvSpPr>
         <p:spPr>
           <a:xfrm>
-            <a:off x="1545787" y="2745186"/>
+            <a:off x="1560301" y="2801257"/>
             <a:ext cx="7453745" cy="1449443"/>
           </a:xfrm>
           <a:prstGeom prst="wedgeRoundRectCallout">
@@ -8606,7 +9065,7 @@
           <p:nvPr/>
         </p:nvPicPr>
         <p:blipFill>
-          <a:blip r:embed="rId2" cstate="print"/>
+          <a:blip r:embed="rId3" cstate="print"/>
           <a:srcRect/>
           <a:stretch>
             <a:fillRect/>
@@ -8632,7 +9091,7 @@
           <p:nvPr/>
         </p:nvPicPr>
         <p:blipFill>
-          <a:blip r:embed="rId3" cstate="print"/>
+          <a:blip r:embed="rId4" cstate="print"/>
           <a:srcRect/>
           <a:stretch>
             <a:fillRect/>
@@ -9962,7 +10421,7 @@
           <a:blip r:embed="rId2" cstate="print">
             <a:extLst>
               <a:ext uri="{28A0092B-C50C-407E-A947-70E740481C1C}">
-                <a14:useLocalDpi xmlns="" xmlns:a14="http://schemas.microsoft.com/office/drawing/2010/main" val="0"/>
+                <a14:useLocalDpi xmlns:a14="http://schemas.microsoft.com/office/drawing/2010/main" xmlns="" val="0"/>
               </a:ext>
             </a:extLst>
           </a:blip>
@@ -10119,7 +10578,7 @@
     </p:spTree>
     <p:extLst>
       <p:ext uri="{BB962C8B-B14F-4D97-AF65-F5344CB8AC3E}">
-        <p14:creationId xmlns="" xmlns:p14="http://schemas.microsoft.com/office/powerpoint/2010/main" val="1982816369"/>
+        <p14:creationId xmlns:p14="http://schemas.microsoft.com/office/powerpoint/2010/main" xmlns="" val="1982816369"/>
       </p:ext>
     </p:extLst>
   </p:cSld>
@@ -10127,7 +10586,7 @@
     <a:masterClrMapping/>
   </p:clrMapOvr>
   <mc:AlternateContent xmlns:mc="http://schemas.openxmlformats.org/markup-compatibility/2006">
-    <mc:Choice xmlns="" xmlns:p14="http://schemas.microsoft.com/office/powerpoint/2010/main" Requires="p14">
+    <mc:Choice xmlns:p14="http://schemas.microsoft.com/office/powerpoint/2010/main" xmlns="" Requires="p14">
       <p:transition spd="slow" p14:dur="2000" advTm="5275"/>
     </mc:Choice>
     <mc:Fallback>
@@ -33639,6 +34098,229 @@
           <a:chExt cx="0" cy="0"/>
         </a:xfrm>
       </p:grpSpPr>
+      <p:pic>
+        <p:nvPicPr>
+          <p:cNvPr id="43012" name="Picture 4" descr="C:\Users\Lorenzo\Documents\GitHub\Tesi\img\grafici_usati\DF_tot_no_arr.png"/>
+          <p:cNvPicPr>
+            <a:picLocks noChangeAspect="1" noChangeArrowheads="1"/>
+          </p:cNvPicPr>
+          <p:nvPr/>
+        </p:nvPicPr>
+        <p:blipFill>
+          <a:blip r:embed="rId3" cstate="print"/>
+          <a:srcRect/>
+          <a:stretch>
+            <a:fillRect/>
+          </a:stretch>
+        </p:blipFill>
+        <p:spPr bwMode="auto">
+          <a:xfrm>
+            <a:off x="3280316" y="1855788"/>
+            <a:ext cx="5863684" cy="4680000"/>
+          </a:xfrm>
+          <a:prstGeom prst="rect">
+            <a:avLst/>
+          </a:prstGeom>
+          <a:noFill/>
+        </p:spPr>
+      </p:pic>
+      <p:sp>
+        <p:nvSpPr>
+          <p:cNvPr id="2" name="Segnaposto testo 1"/>
+          <p:cNvSpPr>
+            <a:spLocks noGrp="1"/>
+          </p:cNvSpPr>
+          <p:nvPr>
+            <p:ph type="body" sz="quarter" idx="10"/>
+          </p:nvPr>
+        </p:nvSpPr>
+        <p:spPr/>
+        <p:txBody>
+          <a:bodyPr/>
+          <a:lstStyle/>
+          <a:p>
+            <a:r>
+              <a:rPr lang="it-IT" dirty="0" smtClean="0"/>
+              <a:t>Soluzione proposta – Dynamic Fanout</a:t>
+            </a:r>
+            <a:endParaRPr lang="it-IT" dirty="0"/>
+          </a:p>
+        </p:txBody>
+      </p:sp>
+      <p:sp>
+        <p:nvSpPr>
+          <p:cNvPr id="5125" name="Rectangle 5"/>
+          <p:cNvSpPr>
+            <a:spLocks noChangeArrowheads="1"/>
+          </p:cNvSpPr>
+          <p:nvPr/>
+        </p:nvSpPr>
+        <p:spPr bwMode="auto">
+          <a:xfrm>
+            <a:off x="0" y="0"/>
+            <a:ext cx="9144000" cy="0"/>
+          </a:xfrm>
+          <a:prstGeom prst="rect">
+            <a:avLst/>
+          </a:prstGeom>
+          <a:noFill/>
+          <a:ln w="9525">
+            <a:noFill/>
+            <a:miter lim="800000"/>
+            <a:headEnd/>
+            <a:tailEnd/>
+          </a:ln>
+          <a:effectLst/>
+        </p:spPr>
+        <p:txBody>
+          <a:bodyPr vert="horz" wrap="none" lIns="91440" tIns="45720" rIns="91440" bIns="45720" numCol="1" anchor="ctr" anchorCtr="0" compatLnSpc="1">
+            <a:prstTxWarp prst="textNoShape">
+              <a:avLst/>
+            </a:prstTxWarp>
+            <a:spAutoFit/>
+          </a:bodyPr>
+          <a:lstStyle/>
+          <a:p>
+            <a:endParaRPr lang="it-IT" dirty="0"/>
+          </a:p>
+        </p:txBody>
+      </p:sp>
+      <p:pic>
+        <p:nvPicPr>
+          <p:cNvPr id="43013" name="Picture 5" descr="C:\Users\Lorenzo\Documents\GitHub\Tesi\img\formule_presentazione\DF_tot.png"/>
+          <p:cNvPicPr>
+            <a:picLocks noChangeAspect="1" noChangeArrowheads="1"/>
+          </p:cNvPicPr>
+          <p:nvPr/>
+        </p:nvPicPr>
+        <p:blipFill>
+          <a:blip r:embed="rId4" cstate="print"/>
+          <a:srcRect/>
+          <a:stretch>
+            <a:fillRect/>
+          </a:stretch>
+        </p:blipFill>
+        <p:spPr bwMode="auto">
+          <a:xfrm>
+            <a:off x="934035" y="884238"/>
+            <a:ext cx="7242175" cy="971550"/>
+          </a:xfrm>
+          <a:prstGeom prst="rect">
+            <a:avLst/>
+          </a:prstGeom>
+          <a:noFill/>
+        </p:spPr>
+      </p:pic>
+      <p:pic>
+        <p:nvPicPr>
+          <p:cNvPr id="6" name="Picture 10" descr="C:\Users\Lorenzo\Documents\GitHub\Tesi\img\formule_presentazione\DF_FB.png"/>
+          <p:cNvPicPr>
+            <a:picLocks noChangeAspect="1" noChangeArrowheads="1"/>
+          </p:cNvPicPr>
+          <p:nvPr/>
+        </p:nvPicPr>
+        <p:blipFill>
+          <a:blip r:embed="rId5" cstate="print"/>
+          <a:srcRect/>
+          <a:stretch>
+            <a:fillRect/>
+          </a:stretch>
+        </p:blipFill>
+        <p:spPr bwMode="auto">
+          <a:xfrm>
+            <a:off x="282789" y="2969088"/>
+            <a:ext cx="2408052" cy="718992"/>
+          </a:xfrm>
+          <a:prstGeom prst="rect">
+            <a:avLst/>
+          </a:prstGeom>
+          <a:noFill/>
+        </p:spPr>
+      </p:pic>
+      <p:pic>
+        <p:nvPicPr>
+          <p:cNvPr id="7" name="Picture 11" descr="C:\Users\Lorenzo\Documents\GitHub\Tesi\img\formule_presentazione\DF_FC.png"/>
+          <p:cNvPicPr>
+            <a:picLocks noChangeAspect="1" noChangeArrowheads="1"/>
+          </p:cNvPicPr>
+          <p:nvPr/>
+        </p:nvPicPr>
+        <p:blipFill>
+          <a:blip r:embed="rId6" cstate="print"/>
+          <a:srcRect/>
+          <a:stretch>
+            <a:fillRect/>
+          </a:stretch>
+        </p:blipFill>
+        <p:spPr bwMode="auto">
+          <a:xfrm>
+            <a:off x="282789" y="3922080"/>
+            <a:ext cx="1980839" cy="468000"/>
+          </a:xfrm>
+          <a:prstGeom prst="rect">
+            <a:avLst/>
+          </a:prstGeom>
+          <a:noFill/>
+        </p:spPr>
+      </p:pic>
+      <p:pic>
+        <p:nvPicPr>
+          <p:cNvPr id="1026" name="Picture 2" descr="C:\Users\Lorenzo\Documents\GitHub\Tesi\img\immagini_presentazione\DF_asintoto.png"/>
+          <p:cNvPicPr>
+            <a:picLocks noChangeAspect="1" noChangeArrowheads="1"/>
+          </p:cNvPicPr>
+          <p:nvPr/>
+        </p:nvPicPr>
+        <p:blipFill>
+          <a:blip r:embed="rId7" cstate="print"/>
+          <a:srcRect/>
+          <a:stretch>
+            <a:fillRect/>
+          </a:stretch>
+        </p:blipFill>
+        <p:spPr bwMode="auto">
+          <a:xfrm>
+            <a:off x="282789" y="4640141"/>
+            <a:ext cx="2880000" cy="317415"/>
+          </a:xfrm>
+          <a:prstGeom prst="rect">
+            <a:avLst/>
+          </a:prstGeom>
+          <a:noFill/>
+        </p:spPr>
+      </p:pic>
+    </p:spTree>
+  </p:cSld>
+  <p:clrMapOvr>
+    <a:masterClrMapping/>
+  </p:clrMapOvr>
+  <p:timing>
+    <p:tnLst>
+      <p:par>
+        <p:cTn id="1" dur="indefinite" restart="never" nodeType="tmRoot"/>
+      </p:par>
+    </p:tnLst>
+  </p:timing>
+</p:sld>
+</file>
+
+<file path=ppt/slides/slide31.xml><?xml version="1.0" encoding="utf-8"?>
+<p:sld xmlns:a="http://schemas.openxmlformats.org/drawingml/2006/main" xmlns:r="http://schemas.openxmlformats.org/officeDocument/2006/relationships" xmlns:p="http://schemas.openxmlformats.org/presentationml/2006/main">
+  <p:cSld>
+    <p:spTree>
+      <p:nvGrpSpPr>
+        <p:cNvPr id="1" name=""/>
+        <p:cNvGrpSpPr/>
+        <p:nvPr/>
+      </p:nvGrpSpPr>
+      <p:grpSpPr>
+        <a:xfrm>
+          <a:off x="0" y="0"/>
+          <a:ext cx="0" cy="0"/>
+          <a:chOff x="0" y="0"/>
+          <a:chExt cx="0" cy="0"/>
+        </a:xfrm>
+      </p:grpSpPr>
       <p:sp>
         <p:nvSpPr>
           <p:cNvPr id="4" name="Segnaposto testo 3"/>
@@ -33700,17 +34382,9 @@
             </a:r>
           </a:p>
           <a:p>
-            <a:pPr>
-              <a:buFont typeface="Arial" pitchFamily="34" charset="0"/>
-              <a:buChar char="•"/>
-            </a:pPr>
             <a:endParaRPr lang="it-IT" sz="2400" dirty="0" smtClean="0"/>
           </a:p>
           <a:p>
-            <a:pPr>
-              <a:buFont typeface="Arial" pitchFamily="34" charset="0"/>
-              <a:buChar char="•"/>
-            </a:pPr>
             <a:endParaRPr lang="it-IT" sz="2400" dirty="0" smtClean="0"/>
           </a:p>
           <a:p>
@@ -33824,7 +34498,7 @@
 </p:sld>
 </file>
 
-<file path=ppt/slides/slide31.xml><?xml version="1.0" encoding="utf-8"?>
+<file path=ppt/slides/slide32.xml><?xml version="1.0" encoding="utf-8"?>
 <p:sld xmlns:a="http://schemas.openxmlformats.org/drawingml/2006/main" xmlns:r="http://schemas.openxmlformats.org/officeDocument/2006/relationships" xmlns:p="http://schemas.openxmlformats.org/presentationml/2006/main">
   <p:cSld>
     <p:spTree>
@@ -33905,6 +34579,76 @@
 </p:sld>
 </file>
 
+<file path=ppt/slides/slide33.xml><?xml version="1.0" encoding="utf-8"?>
+<p:sld xmlns:a="http://schemas.openxmlformats.org/drawingml/2006/main" xmlns:r="http://schemas.openxmlformats.org/officeDocument/2006/relationships" xmlns:p="http://schemas.openxmlformats.org/presentationml/2006/main">
+  <p:cSld>
+    <p:spTree>
+      <p:nvGrpSpPr>
+        <p:cNvPr id="1" name=""/>
+        <p:cNvGrpSpPr/>
+        <p:nvPr/>
+      </p:nvGrpSpPr>
+      <p:grpSpPr>
+        <a:xfrm>
+          <a:off x="0" y="0"/>
+          <a:ext cx="0" cy="0"/>
+          <a:chOff x="0" y="0"/>
+          <a:chExt cx="0" cy="0"/>
+        </a:xfrm>
+      </p:grpSpPr>
+      <p:sp>
+        <p:nvSpPr>
+          <p:cNvPr id="2" name="Segnaposto testo 1"/>
+          <p:cNvSpPr>
+            <a:spLocks noGrp="1"/>
+          </p:cNvSpPr>
+          <p:nvPr>
+            <p:ph type="body" sz="quarter" idx="10"/>
+          </p:nvPr>
+        </p:nvSpPr>
+        <p:spPr/>
+        <p:txBody>
+          <a:bodyPr/>
+          <a:lstStyle/>
+          <a:p>
+            <a:endParaRPr lang="it-IT"/>
+          </a:p>
+        </p:txBody>
+      </p:sp>
+      <p:sp>
+        <p:nvSpPr>
+          <p:cNvPr id="3" name="Segnaposto testo 2"/>
+          <p:cNvSpPr>
+            <a:spLocks noGrp="1"/>
+          </p:cNvSpPr>
+          <p:nvPr>
+            <p:ph type="body" sz="quarter" idx="11"/>
+          </p:nvPr>
+        </p:nvSpPr>
+        <p:spPr/>
+        <p:txBody>
+          <a:bodyPr/>
+          <a:lstStyle/>
+          <a:p>
+            <a:endParaRPr lang="it-IT"/>
+          </a:p>
+        </p:txBody>
+      </p:sp>
+    </p:spTree>
+  </p:cSld>
+  <p:clrMapOvr>
+    <a:masterClrMapping/>
+  </p:clrMapOvr>
+  <p:timing>
+    <p:tnLst>
+      <p:par>
+        <p:cTn id="1" dur="indefinite" restart="never" nodeType="tmRoot"/>
+      </p:par>
+    </p:tnLst>
+  </p:timing>
+</p:sld>
+</file>
+
 <file path=ppt/slides/slide4.xml><?xml version="1.0" encoding="utf-8"?>
 <p:sld xmlns:a="http://schemas.openxmlformats.org/drawingml/2006/main" xmlns:r="http://schemas.openxmlformats.org/officeDocument/2006/relationships" xmlns:p="http://schemas.openxmlformats.org/presentationml/2006/main">
   <p:cSld>
@@ -33955,7 +34699,12 @@
             <p:ph type="body" sz="quarter" idx="11"/>
           </p:nvPr>
         </p:nvSpPr>
-        <p:spPr/>
+        <p:spPr>
+          <a:xfrm>
+            <a:off x="698500" y="1103314"/>
+            <a:ext cx="7061200" cy="5246687"/>
+          </a:xfrm>
+        </p:spPr>
         <p:txBody>
           <a:bodyPr/>
           <a:lstStyle/>
@@ -35392,13 +36141,8 @@
             </a:pPr>
             <a:r>
               <a:rPr lang="it-IT" sz="2400" dirty="0" smtClean="0"/>
-              <a:t>Assenza </a:t>
+              <a:t>Assenza di protocolli per la diffusione dei messaggi</a:t>
             </a:r>
-            <a:r>
-              <a:rPr lang="it-IT" sz="2400" dirty="0" smtClean="0"/>
-              <a:t>controlli centralizzati e di autenticazione</a:t>
-            </a:r>
-            <a:endParaRPr lang="it-IT" sz="2400" dirty="0" smtClean="0"/>
           </a:p>
           <a:p>
             <a:pPr>
@@ -35413,9 +36157,14 @@
               <a:rPr lang="it-IT" sz="2400" dirty="0" smtClean="0"/>
             </a:br>
             <a:r>
-              <a:rPr lang="it-IT" sz="2400" dirty="0" smtClean="0"/>
-              <a:t>visione locale della rete</a:t>
+              <a:rPr lang="it-IT" sz="2400" smtClean="0"/>
+              <a:t>visione </a:t>
             </a:r>
+            <a:r>
+              <a:rPr lang="it-IT" sz="2400" smtClean="0"/>
+              <a:t>locale</a:t>
+            </a:r>
+            <a:endParaRPr lang="it-IT" sz="2400" dirty="0" smtClean="0"/>
           </a:p>
           <a:p>
             <a:pPr>
@@ -35553,7 +36302,7 @@
             </a:pPr>
             <a:r>
               <a:rPr lang="it-IT" sz="2400" dirty="0" smtClean="0"/>
-              <a:t>Utilizza dispositivi di comune utilizzo: </a:t>
+              <a:t>Sfrutta dispositivi di comune utilizzo: </a:t>
             </a:r>
             <a:r>
               <a:rPr lang="it-IT" sz="2400" b="1" i="1" dirty="0" smtClean="0">
@@ -35628,7 +36377,7 @@
           <p:nvPr/>
         </p:nvPicPr>
         <p:blipFill>
-          <a:blip r:embed="rId2" cstate="print"/>
+          <a:blip r:embed="rId3" cstate="print"/>
           <a:srcRect/>
           <a:stretch>
             <a:fillRect/>

</xml_diff>